<commit_message>
made replay ratio work for less than 1
</commit_message>
<xml_diff>
--- a/FeasibilityStudy_07_09_2023.pptx
+++ b/FeasibilityStudy_07_09_2023.pptx
@@ -10,9 +10,11 @@
     <p:sldId id="262" r:id="rId7"/>
     <p:sldId id="272" r:id="rId8"/>
     <p:sldId id="273" r:id="rId9"/>
-    <p:sldId id="274" r:id="rId10"/>
-    <p:sldId id="260" r:id="rId11"/>
-    <p:sldId id="259" r:id="rId12"/>
+    <p:sldId id="275" r:id="rId10"/>
+    <p:sldId id="274" r:id="rId11"/>
+    <p:sldId id="260" r:id="rId12"/>
+    <p:sldId id="259" r:id="rId13"/>
+    <p:sldId id="276" r:id="rId14"/>
   </p:sldIdLst>
   <p:sldSz cx="12192000" cy="6858000"/>
   <p:notesSz cx="6858000" cy="9144000"/>
@@ -1187,7 +1189,7 @@
           <a:p>
             <a:fld id="{02AC24A9-CCB6-4F8D-B8DB-C2F3692CFA5A}" type="datetimeFigureOut">
               <a:rPr lang="en-US" smtClean="0"/>
-              <a:t>9/22/2023</a:t>
+              <a:t>9/25/2023</a:t>
             </a:fld>
             <a:endParaRPr lang="en-US" dirty="0"/>
           </a:p>
@@ -1557,7 +1559,7 @@
           <a:p>
             <a:fld id="{02AC24A9-CCB6-4F8D-B8DB-C2F3692CFA5A}" type="datetimeFigureOut">
               <a:rPr lang="en-US" smtClean="0"/>
-              <a:t>9/22/2023</a:t>
+              <a:t>9/25/2023</a:t>
             </a:fld>
             <a:endParaRPr lang="en-US"/>
           </a:p>
@@ -1766,7 +1768,7 @@
           <a:p>
             <a:fld id="{02AC24A9-CCB6-4F8D-B8DB-C2F3692CFA5A}" type="datetimeFigureOut">
               <a:rPr lang="en-US" smtClean="0"/>
-              <a:t>9/22/2023</a:t>
+              <a:t>9/25/2023</a:t>
             </a:fld>
             <a:endParaRPr lang="en-US"/>
           </a:p>
@@ -2236,7 +2238,7 @@
           <a:p>
             <a:fld id="{02AC24A9-CCB6-4F8D-B8DB-C2F3692CFA5A}" type="datetimeFigureOut">
               <a:rPr lang="en-US" smtClean="0"/>
-              <a:t>9/22/2023</a:t>
+              <a:t>9/25/2023</a:t>
             </a:fld>
             <a:endParaRPr lang="en-US"/>
           </a:p>
@@ -2690,7 +2692,7 @@
           <a:p>
             <a:fld id="{02AC24A9-CCB6-4F8D-B8DB-C2F3692CFA5A}" type="datetimeFigureOut">
               <a:rPr lang="en-US" smtClean="0"/>
-              <a:t>9/22/2023</a:t>
+              <a:t>9/25/2023</a:t>
             </a:fld>
             <a:endParaRPr lang="en-US"/>
           </a:p>
@@ -3222,7 +3224,7 @@
           <a:p>
             <a:fld id="{02AC24A9-CCB6-4F8D-B8DB-C2F3692CFA5A}" type="datetimeFigureOut">
               <a:rPr lang="en-US" smtClean="0"/>
-              <a:t>9/22/2023</a:t>
+              <a:t>9/25/2023</a:t>
             </a:fld>
             <a:endParaRPr lang="en-US"/>
           </a:p>
@@ -3921,7 +3923,7 @@
           <a:p>
             <a:fld id="{02AC24A9-CCB6-4F8D-B8DB-C2F3692CFA5A}" type="datetimeFigureOut">
               <a:rPr lang="en-US" smtClean="0"/>
-              <a:t>9/22/2023</a:t>
+              <a:t>9/25/2023</a:t>
             </a:fld>
             <a:endParaRPr lang="en-US"/>
           </a:p>
@@ -4250,7 +4252,7 @@
           <a:p>
             <a:fld id="{02AC24A9-CCB6-4F8D-B8DB-C2F3692CFA5A}" type="datetimeFigureOut">
               <a:rPr lang="en-US" smtClean="0"/>
-              <a:t>9/22/2023</a:t>
+              <a:t>9/25/2023</a:t>
             </a:fld>
             <a:endParaRPr lang="en-US"/>
           </a:p>
@@ -4363,7 +4365,7 @@
           <a:p>
             <a:fld id="{02AC24A9-CCB6-4F8D-B8DB-C2F3692CFA5A}" type="datetimeFigureOut">
               <a:rPr lang="en-US" smtClean="0"/>
-              <a:t>9/22/2023</a:t>
+              <a:t>9/25/2023</a:t>
             </a:fld>
             <a:endParaRPr lang="en-US"/>
           </a:p>
@@ -4858,7 +4860,7 @@
           <a:p>
             <a:fld id="{02AC24A9-CCB6-4F8D-B8DB-C2F3692CFA5A}" type="datetimeFigureOut">
               <a:rPr lang="en-US" smtClean="0"/>
-              <a:t>9/22/2023</a:t>
+              <a:t>9/25/2023</a:t>
             </a:fld>
             <a:endParaRPr lang="en-US" dirty="0"/>
           </a:p>
@@ -5335,7 +5337,7 @@
           <a:p>
             <a:fld id="{02AC24A9-CCB6-4F8D-B8DB-C2F3692CFA5A}" type="datetimeFigureOut">
               <a:rPr lang="en-US" smtClean="0"/>
-              <a:t>9/22/2023</a:t>
+              <a:t>9/25/2023</a:t>
             </a:fld>
             <a:endParaRPr lang="en-US"/>
           </a:p>
@@ -5578,7 +5580,7 @@
           <a:p>
             <a:fld id="{02AC24A9-CCB6-4F8D-B8DB-C2F3692CFA5A}" type="datetimeFigureOut">
               <a:rPr lang="en-US" smtClean="0"/>
-              <a:t>9/22/2023</a:t>
+              <a:t>9/25/2023</a:t>
             </a:fld>
             <a:endParaRPr lang="en-US"/>
           </a:p>
@@ -6454,6 +6456,244 @@
 </p:sld>
 </file>
 
+<file path=ppt/slides/slide10.xml><?xml version="1.0" encoding="utf-8"?>
+<p:sld xmlns:a="http://schemas.openxmlformats.org/drawingml/2006/main" xmlns:r="http://schemas.openxmlformats.org/officeDocument/2006/relationships" xmlns:p="http://schemas.openxmlformats.org/presentationml/2006/main">
+  <p:cSld>
+    <p:spTree>
+      <p:nvGrpSpPr>
+        <p:cNvPr id="1" name=""/>
+        <p:cNvGrpSpPr/>
+        <p:nvPr/>
+      </p:nvGrpSpPr>
+      <p:grpSpPr>
+        <a:xfrm>
+          <a:off x="0" y="0"/>
+          <a:ext cx="0" cy="0"/>
+          <a:chOff x="0" y="0"/>
+          <a:chExt cx="0" cy="0"/>
+        </a:xfrm>
+      </p:grpSpPr>
+      <p:sp>
+        <p:nvSpPr>
+          <p:cNvPr id="2" name="Title 1">
+            <a:extLst>
+              <a:ext uri="{FF2B5EF4-FFF2-40B4-BE49-F238E27FC236}">
+                <a16:creationId xmlns:a16="http://schemas.microsoft.com/office/drawing/2014/main" id="{24B9C0BC-532D-D351-1CE0-AB8E1842A634}"/>
+              </a:ext>
+            </a:extLst>
+          </p:cNvPr>
+          <p:cNvSpPr>
+            <a:spLocks noGrp="1"/>
+          </p:cNvSpPr>
+          <p:nvPr>
+            <p:ph type="title"/>
+          </p:nvPr>
+        </p:nvSpPr>
+        <p:spPr/>
+        <p:txBody>
+          <a:bodyPr/>
+          <a:lstStyle/>
+          <a:p>
+            <a:r>
+              <a:rPr lang="en-GB" dirty="0"/>
+              <a:t>Ultra-reliable – 5 Run repeats</a:t>
+            </a:r>
+          </a:p>
+        </p:txBody>
+      </p:sp>
+      <p:graphicFrame>
+        <p:nvGraphicFramePr>
+          <p:cNvPr id="4" name="Content Placeholder 3">
+            <a:extLst>
+              <a:ext uri="{FF2B5EF4-FFF2-40B4-BE49-F238E27FC236}">
+                <a16:creationId xmlns:a16="http://schemas.microsoft.com/office/drawing/2014/main" id="{4164FEBF-9FCF-D46D-8E5D-74C8FDEDA3E9}"/>
+              </a:ext>
+            </a:extLst>
+          </p:cNvPr>
+          <p:cNvGraphicFramePr>
+            <a:graphicFrameLocks noGrp="1"/>
+          </p:cNvGraphicFramePr>
+          <p:nvPr>
+            <p:ph idx="1"/>
+            <p:extLst>
+              <p:ext uri="{D42A27DB-BD31-4B8C-83A1-F6EECF244321}">
+                <p14:modId xmlns:p14="http://schemas.microsoft.com/office/powerpoint/2010/main" val="2701996081"/>
+              </p:ext>
+            </p:extLst>
+          </p:nvPr>
+        </p:nvGraphicFramePr>
+        <p:xfrm>
+          <a:off x="771456" y="2248384"/>
+          <a:ext cx="5953410" cy="741680"/>
+        </p:xfrm>
+        <a:graphic>
+          <a:graphicData uri="http://schemas.openxmlformats.org/drawingml/2006/table">
+            <a:tbl>
+              <a:tblPr firstCol="1" bandRow="1">
+                <a:tableStyleId>{5C22544A-7EE6-4342-B048-85BDC9FD1C3A}</a:tableStyleId>
+              </a:tblPr>
+              <a:tblGrid>
+                <a:gridCol w="2028946">
+                  <a:extLst>
+                    <a:ext uri="{9D8B030D-6E8A-4147-A177-3AD203B41FA5}">
+                      <a16:colId xmlns:a16="http://schemas.microsoft.com/office/drawing/2014/main" val="1480766151"/>
+                    </a:ext>
+                  </a:extLst>
+                </a:gridCol>
+                <a:gridCol w="996813">
+                  <a:extLst>
+                    <a:ext uri="{9D8B030D-6E8A-4147-A177-3AD203B41FA5}">
+                      <a16:colId xmlns:a16="http://schemas.microsoft.com/office/drawing/2014/main" val="1779393713"/>
+                    </a:ext>
+                  </a:extLst>
+                </a:gridCol>
+                <a:gridCol w="1235892">
+                  <a:extLst>
+                    <a:ext uri="{9D8B030D-6E8A-4147-A177-3AD203B41FA5}">
+                      <a16:colId xmlns:a16="http://schemas.microsoft.com/office/drawing/2014/main" val="3895533353"/>
+                    </a:ext>
+                  </a:extLst>
+                </a:gridCol>
+                <a:gridCol w="1691759">
+                  <a:extLst>
+                    <a:ext uri="{9D8B030D-6E8A-4147-A177-3AD203B41FA5}">
+                      <a16:colId xmlns:a16="http://schemas.microsoft.com/office/drawing/2014/main" val="2183006850"/>
+                    </a:ext>
+                  </a:extLst>
+                </a:gridCol>
+              </a:tblGrid>
+              <a:tr h="370840">
+                <a:tc>
+                  <a:txBody>
+                    <a:bodyPr/>
+                    <a:lstStyle/>
+                    <a:p>
+                      <a:endParaRPr lang="en-GB" sz="1050" dirty="0"/>
+                    </a:p>
+                  </a:txBody>
+                  <a:tcPr/>
+                </a:tc>
+                <a:tc>
+                  <a:txBody>
+                    <a:bodyPr/>
+                    <a:lstStyle/>
+                    <a:p>
+                      <a:r>
+                        <a:rPr lang="en-GB" sz="1200" dirty="0"/>
+                        <a:t>Early Churn</a:t>
+                      </a:r>
+                    </a:p>
+                  </a:txBody>
+                  <a:tcPr/>
+                </a:tc>
+                <a:tc>
+                  <a:txBody>
+                    <a:bodyPr/>
+                    <a:lstStyle/>
+                    <a:p>
+                      <a:r>
+                        <a:rPr lang="en-GB" sz="1200" dirty="0"/>
+                        <a:t>Late Churn</a:t>
+                      </a:r>
+                    </a:p>
+                  </a:txBody>
+                  <a:tcPr/>
+                </a:tc>
+                <a:tc>
+                  <a:txBody>
+                    <a:bodyPr/>
+                    <a:lstStyle/>
+                    <a:p>
+                      <a:r>
+                        <a:rPr lang="en-GB" sz="1200" dirty="0"/>
+                        <a:t>Performance</a:t>
+                      </a:r>
+                    </a:p>
+                  </a:txBody>
+                  <a:tcPr/>
+                </a:tc>
+                <a:extLst>
+                  <a:ext uri="{0D108BD9-81ED-4DB2-BD59-A6C34878D82A}">
+                    <a16:rowId xmlns:a16="http://schemas.microsoft.com/office/drawing/2014/main" val="2396724531"/>
+                  </a:ext>
+                </a:extLst>
+              </a:tr>
+              <a:tr h="370840">
+                <a:tc>
+                  <a:txBody>
+                    <a:bodyPr/>
+                    <a:lstStyle/>
+                    <a:p>
+                      <a:r>
+                        <a:rPr lang="en-GB" sz="1000" dirty="0"/>
+                        <a:t>DDQN</a:t>
+                      </a:r>
+                    </a:p>
+                  </a:txBody>
+                  <a:tcPr/>
+                </a:tc>
+                <a:tc>
+                  <a:txBody>
+                    <a:bodyPr/>
+                    <a:lstStyle/>
+                    <a:p>
+                      <a:r>
+                        <a:rPr lang="en-GB" sz="1200" dirty="0"/>
+                        <a:t>3.7%</a:t>
+                      </a:r>
+                    </a:p>
+                  </a:txBody>
+                  <a:tcPr/>
+                </a:tc>
+                <a:tc>
+                  <a:txBody>
+                    <a:bodyPr/>
+                    <a:lstStyle/>
+                    <a:p>
+                      <a:r>
+                        <a:rPr lang="en-GB" sz="1200" dirty="0"/>
+                        <a:t>1.8%</a:t>
+                      </a:r>
+                    </a:p>
+                  </a:txBody>
+                  <a:tcPr/>
+                </a:tc>
+                <a:tc>
+                  <a:txBody>
+                    <a:bodyPr/>
+                    <a:lstStyle/>
+                    <a:p>
+                      <a:r>
+                        <a:rPr lang="en-GB" sz="1200" dirty="0"/>
+                        <a:t>0.082</a:t>
+                      </a:r>
+                    </a:p>
+                  </a:txBody>
+                  <a:tcPr/>
+                </a:tc>
+                <a:extLst>
+                  <a:ext uri="{0D108BD9-81ED-4DB2-BD59-A6C34878D82A}">
+                    <a16:rowId xmlns:a16="http://schemas.microsoft.com/office/drawing/2014/main" val="3538636818"/>
+                  </a:ext>
+                </a:extLst>
+              </a:tr>
+            </a:tbl>
+          </a:graphicData>
+        </a:graphic>
+      </p:graphicFrame>
+    </p:spTree>
+    <p:extLst>
+      <p:ext uri="{BB962C8B-B14F-4D97-AF65-F5344CB8AC3E}">
+        <p14:creationId xmlns:p14="http://schemas.microsoft.com/office/powerpoint/2010/main" val="2459990870"/>
+      </p:ext>
+    </p:extLst>
+  </p:cSld>
+  <p:clrMapOvr>
+    <a:masterClrMapping/>
+  </p:clrMapOvr>
+</p:sld>
+</file>
+
 <file path=ppt/slides/slide2.xml><?xml version="1.0" encoding="utf-8"?>
 <p:sld xmlns:a="http://schemas.openxmlformats.org/drawingml/2006/main" xmlns:r="http://schemas.openxmlformats.org/officeDocument/2006/relationships" xmlns:p="http://schemas.openxmlformats.org/presentationml/2006/main">
   <p:cSld>
@@ -7306,7 +7546,7 @@
             <p:ph idx="1"/>
             <p:extLst>
               <p:ext uri="{D42A27DB-BD31-4B8C-83A1-F6EECF244321}">
-                <p14:modId xmlns:p14="http://schemas.microsoft.com/office/powerpoint/2010/main" val="3438023745"/>
+                <p14:modId xmlns:p14="http://schemas.microsoft.com/office/powerpoint/2010/main" val="1464103706"/>
               </p:ext>
             </p:extLst>
           </p:nvPr>
@@ -7755,7 +7995,7 @@
                     <a:p>
                       <a:r>
                         <a:rPr lang="en-GB" dirty="0"/>
-                        <a:t>4%</a:t>
+                        <a:t>4.9%</a:t>
                       </a:r>
                     </a:p>
                   </a:txBody>
@@ -7768,7 +8008,7 @@
                     <a:p>
                       <a:r>
                         <a:rPr lang="en-GB" dirty="0"/>
-                        <a:t>1.5%</a:t>
+                        <a:t>2.5%</a:t>
                       </a:r>
                     </a:p>
                   </a:txBody>
@@ -7874,6 +8114,583 @@
 </file>
 
 <file path=ppt/slides/slide6.xml><?xml version="1.0" encoding="utf-8"?>
+<p:sld xmlns:a="http://schemas.openxmlformats.org/drawingml/2006/main" xmlns:r="http://schemas.openxmlformats.org/officeDocument/2006/relationships" xmlns:p="http://schemas.openxmlformats.org/presentationml/2006/main">
+  <p:cSld>
+    <p:spTree>
+      <p:nvGrpSpPr>
+        <p:cNvPr id="1" name=""/>
+        <p:cNvGrpSpPr/>
+        <p:nvPr/>
+      </p:nvGrpSpPr>
+      <p:grpSpPr>
+        <a:xfrm>
+          <a:off x="0" y="0"/>
+          <a:ext cx="0" cy="0"/>
+          <a:chOff x="0" y="0"/>
+          <a:chExt cx="0" cy="0"/>
+        </a:xfrm>
+      </p:grpSpPr>
+      <p:sp>
+        <p:nvSpPr>
+          <p:cNvPr id="2" name="Title 1">
+            <a:extLst>
+              <a:ext uri="{FF2B5EF4-FFF2-40B4-BE49-F238E27FC236}">
+                <a16:creationId xmlns:a16="http://schemas.microsoft.com/office/drawing/2014/main" id="{817C01D3-8A8D-B282-B68D-5CD95A38D6A5}"/>
+              </a:ext>
+            </a:extLst>
+          </p:cNvPr>
+          <p:cNvSpPr>
+            <a:spLocks noGrp="1"/>
+          </p:cNvSpPr>
+          <p:nvPr>
+            <p:ph type="title"/>
+          </p:nvPr>
+        </p:nvSpPr>
+        <p:spPr/>
+        <p:txBody>
+          <a:bodyPr/>
+          <a:lstStyle/>
+          <a:p>
+            <a:r>
+              <a:rPr lang="en-GB" dirty="0"/>
+              <a:t>Reward Proportion (All Games)</a:t>
+            </a:r>
+          </a:p>
+        </p:txBody>
+      </p:sp>
+      <p:sp>
+        <p:nvSpPr>
+          <p:cNvPr id="3" name="Content Placeholder 2">
+            <a:extLst>
+              <a:ext uri="{FF2B5EF4-FFF2-40B4-BE49-F238E27FC236}">
+                <a16:creationId xmlns:a16="http://schemas.microsoft.com/office/drawing/2014/main" id="{32BF866D-CDBC-E76C-079D-695ABFBF2E4D}"/>
+              </a:ext>
+            </a:extLst>
+          </p:cNvPr>
+          <p:cNvSpPr>
+            <a:spLocks noGrp="1"/>
+          </p:cNvSpPr>
+          <p:nvPr>
+            <p:ph idx="1"/>
+          </p:nvPr>
+        </p:nvSpPr>
+        <p:spPr/>
+        <p:txBody>
+          <a:bodyPr/>
+          <a:lstStyle/>
+          <a:p>
+            <a:endParaRPr lang="en-GB"/>
+          </a:p>
+        </p:txBody>
+      </p:sp>
+      <p:graphicFrame>
+        <p:nvGraphicFramePr>
+          <p:cNvPr id="4" name="Table 4">
+            <a:extLst>
+              <a:ext uri="{FF2B5EF4-FFF2-40B4-BE49-F238E27FC236}">
+                <a16:creationId xmlns:a16="http://schemas.microsoft.com/office/drawing/2014/main" id="{E5A1B714-120D-F540-E267-4D5F441BC504}"/>
+              </a:ext>
+            </a:extLst>
+          </p:cNvPr>
+          <p:cNvGraphicFramePr>
+            <a:graphicFrameLocks/>
+          </p:cNvGraphicFramePr>
+          <p:nvPr>
+            <p:extLst>
+              <p:ext uri="{D42A27DB-BD31-4B8C-83A1-F6EECF244321}">
+                <p14:modId xmlns:p14="http://schemas.microsoft.com/office/powerpoint/2010/main" val="3816934221"/>
+              </p:ext>
+            </p:extLst>
+          </p:nvPr>
+        </p:nvGraphicFramePr>
+        <p:xfrm>
+          <a:off x="400220" y="1728216"/>
+          <a:ext cx="7758740" cy="4083913"/>
+        </p:xfrm>
+        <a:graphic>
+          <a:graphicData uri="http://schemas.openxmlformats.org/drawingml/2006/table">
+            <a:tbl>
+              <a:tblPr firstRow="1" bandRow="1">
+                <a:tableStyleId>{5C22544A-7EE6-4342-B048-85BDC9FD1C3A}</a:tableStyleId>
+              </a:tblPr>
+              <a:tblGrid>
+                <a:gridCol w="2071711">
+                  <a:extLst>
+                    <a:ext uri="{9D8B030D-6E8A-4147-A177-3AD203B41FA5}">
+                      <a16:colId xmlns:a16="http://schemas.microsoft.com/office/drawing/2014/main" val="3249405573"/>
+                    </a:ext>
+                  </a:extLst>
+                </a:gridCol>
+                <a:gridCol w="1807659">
+                  <a:extLst>
+                    <a:ext uri="{9D8B030D-6E8A-4147-A177-3AD203B41FA5}">
+                      <a16:colId xmlns:a16="http://schemas.microsoft.com/office/drawing/2014/main" val="1374060826"/>
+                    </a:ext>
+                  </a:extLst>
+                </a:gridCol>
+                <a:gridCol w="1939685">
+                  <a:extLst>
+                    <a:ext uri="{9D8B030D-6E8A-4147-A177-3AD203B41FA5}">
+                      <a16:colId xmlns:a16="http://schemas.microsoft.com/office/drawing/2014/main" val="3289418570"/>
+                    </a:ext>
+                  </a:extLst>
+                </a:gridCol>
+                <a:gridCol w="1939685">
+                  <a:extLst>
+                    <a:ext uri="{9D8B030D-6E8A-4147-A177-3AD203B41FA5}">
+                      <a16:colId xmlns:a16="http://schemas.microsoft.com/office/drawing/2014/main" val="1928808689"/>
+                    </a:ext>
+                  </a:extLst>
+                </a:gridCol>
+              </a:tblGrid>
+              <a:tr h="790435">
+                <a:tc>
+                  <a:txBody>
+                    <a:bodyPr/>
+                    <a:lstStyle/>
+                    <a:p>
+                      <a:r>
+                        <a:rPr lang="en-GB" dirty="0"/>
+                        <a:t>Algorithm</a:t>
+                      </a:r>
+                    </a:p>
+                  </a:txBody>
+                  <a:tcPr/>
+                </a:tc>
+                <a:tc>
+                  <a:txBody>
+                    <a:bodyPr/>
+                    <a:lstStyle/>
+                    <a:p>
+                      <a:r>
+                        <a:rPr lang="en-GB" dirty="0"/>
+                        <a:t>Early Churn</a:t>
+                      </a:r>
+                    </a:p>
+                  </a:txBody>
+                  <a:tcPr/>
+                </a:tc>
+                <a:tc>
+                  <a:txBody>
+                    <a:bodyPr/>
+                    <a:lstStyle/>
+                    <a:p>
+                      <a:r>
+                        <a:rPr lang="en-GB" dirty="0"/>
+                        <a:t>Late Churn</a:t>
+                      </a:r>
+                    </a:p>
+                  </a:txBody>
+                  <a:tcPr/>
+                </a:tc>
+                <a:tc>
+                  <a:txBody>
+                    <a:bodyPr/>
+                    <a:lstStyle/>
+                    <a:p>
+                      <a:r>
+                        <a:rPr lang="en-GB" dirty="0"/>
+                        <a:t>Final Reward Proportion </a:t>
+                      </a:r>
+                    </a:p>
+                  </a:txBody>
+                  <a:tcPr/>
+                </a:tc>
+                <a:extLst>
+                  <a:ext uri="{0D108BD9-81ED-4DB2-BD59-A6C34878D82A}">
+                    <a16:rowId xmlns:a16="http://schemas.microsoft.com/office/drawing/2014/main" val="2451696198"/>
+                  </a:ext>
+                </a:extLst>
+              </a:tr>
+              <a:tr h="457950">
+                <a:tc>
+                  <a:txBody>
+                    <a:bodyPr/>
+                    <a:lstStyle/>
+                    <a:p>
+                      <a:r>
+                        <a:rPr lang="en-GB" dirty="0"/>
+                        <a:t>DDQN n=10</a:t>
+                      </a:r>
+                    </a:p>
+                  </a:txBody>
+                  <a:tcPr/>
+                </a:tc>
+                <a:tc>
+                  <a:txBody>
+                    <a:bodyPr/>
+                    <a:lstStyle/>
+                    <a:p>
+                      <a:r>
+                        <a:rPr lang="en-GB" dirty="0"/>
+                        <a:t>3.8%</a:t>
+                      </a:r>
+                    </a:p>
+                  </a:txBody>
+                  <a:tcPr/>
+                </a:tc>
+                <a:tc>
+                  <a:txBody>
+                    <a:bodyPr/>
+                    <a:lstStyle/>
+                    <a:p>
+                      <a:r>
+                        <a:rPr lang="en-GB" dirty="0"/>
+                        <a:t>1.9%</a:t>
+                      </a:r>
+                    </a:p>
+                  </a:txBody>
+                  <a:tcPr/>
+                </a:tc>
+                <a:tc>
+                  <a:txBody>
+                    <a:bodyPr/>
+                    <a:lstStyle/>
+                    <a:p>
+                      <a:r>
+                        <a:rPr lang="en-GB" dirty="0"/>
+                        <a:t>15.4%</a:t>
+                      </a:r>
+                    </a:p>
+                  </a:txBody>
+                  <a:tcPr/>
+                </a:tc>
+                <a:extLst>
+                  <a:ext uri="{0D108BD9-81ED-4DB2-BD59-A6C34878D82A}">
+                    <a16:rowId xmlns:a16="http://schemas.microsoft.com/office/drawing/2014/main" val="123266473"/>
+                  </a:ext>
+                </a:extLst>
+              </a:tr>
+              <a:tr h="457950">
+                <a:tc>
+                  <a:txBody>
+                    <a:bodyPr/>
+                    <a:lstStyle/>
+                    <a:p>
+                      <a:pPr marL="0" marR="0" lvl="0" indent="0" algn="l" defTabSz="914400" rtl="0" eaLnBrk="1" fontAlgn="auto" latinLnBrk="0" hangingPunct="1">
+                        <a:lnSpc>
+                          <a:spcPct val="100000"/>
+                        </a:lnSpc>
+                        <a:spcBef>
+                          <a:spcPts val="0"/>
+                        </a:spcBef>
+                        <a:spcAft>
+                          <a:spcPts val="0"/>
+                        </a:spcAft>
+                        <a:buClrTx/>
+                        <a:buSzTx/>
+                        <a:buFontTx/>
+                        <a:buNone/>
+                        <a:tabLst/>
+                        <a:defRPr/>
+                      </a:pPr>
+                      <a:r>
+                        <a:rPr lang="en-GB" dirty="0"/>
+                        <a:t>DDQN n=3</a:t>
+                      </a:r>
+                    </a:p>
+                  </a:txBody>
+                  <a:tcPr/>
+                </a:tc>
+                <a:tc>
+                  <a:txBody>
+                    <a:bodyPr/>
+                    <a:lstStyle/>
+                    <a:p>
+                      <a:r>
+                        <a:rPr lang="en-GB" dirty="0"/>
+                        <a:t>5.6%</a:t>
+                      </a:r>
+                    </a:p>
+                  </a:txBody>
+                  <a:tcPr/>
+                </a:tc>
+                <a:tc>
+                  <a:txBody>
+                    <a:bodyPr/>
+                    <a:lstStyle/>
+                    <a:p>
+                      <a:r>
+                        <a:rPr lang="en-GB" dirty="0"/>
+                        <a:t>2.8%</a:t>
+                      </a:r>
+                    </a:p>
+                  </a:txBody>
+                  <a:tcPr/>
+                </a:tc>
+                <a:tc>
+                  <a:txBody>
+                    <a:bodyPr/>
+                    <a:lstStyle/>
+                    <a:p>
+                      <a:endParaRPr lang="en-GB" dirty="0"/>
+                    </a:p>
+                  </a:txBody>
+                  <a:tcPr/>
+                </a:tc>
+                <a:extLst>
+                  <a:ext uri="{0D108BD9-81ED-4DB2-BD59-A6C34878D82A}">
+                    <a16:rowId xmlns:a16="http://schemas.microsoft.com/office/drawing/2014/main" val="3376540661"/>
+                  </a:ext>
+                </a:extLst>
+              </a:tr>
+              <a:tr h="457950">
+                <a:tc>
+                  <a:txBody>
+                    <a:bodyPr/>
+                    <a:lstStyle/>
+                    <a:p>
+                      <a:pPr marL="0" marR="0" lvl="0" indent="0" algn="l" defTabSz="914400" rtl="0" eaLnBrk="1" fontAlgn="auto" latinLnBrk="0" hangingPunct="1">
+                        <a:lnSpc>
+                          <a:spcPct val="100000"/>
+                        </a:lnSpc>
+                        <a:spcBef>
+                          <a:spcPts val="0"/>
+                        </a:spcBef>
+                        <a:spcAft>
+                          <a:spcPts val="0"/>
+                        </a:spcAft>
+                        <a:buClrTx/>
+                        <a:buSzTx/>
+                        <a:buFontTx/>
+                        <a:buNone/>
+                        <a:tabLst/>
+                        <a:defRPr/>
+                      </a:pPr>
+                      <a:r>
+                        <a:rPr lang="en-GB" dirty="0"/>
+                        <a:t>DDQN n=1</a:t>
+                      </a:r>
+                    </a:p>
+                  </a:txBody>
+                  <a:tcPr/>
+                </a:tc>
+                <a:tc>
+                  <a:txBody>
+                    <a:bodyPr/>
+                    <a:lstStyle/>
+                    <a:p>
+                      <a:r>
+                        <a:rPr lang="en-GB" dirty="0"/>
+                        <a:t>10.9%</a:t>
+                      </a:r>
+                    </a:p>
+                  </a:txBody>
+                  <a:tcPr/>
+                </a:tc>
+                <a:tc>
+                  <a:txBody>
+                    <a:bodyPr/>
+                    <a:lstStyle/>
+                    <a:p>
+                      <a:r>
+                        <a:rPr lang="en-GB" dirty="0"/>
+                        <a:t>5.7%</a:t>
+                      </a:r>
+                    </a:p>
+                  </a:txBody>
+                  <a:tcPr/>
+                </a:tc>
+                <a:tc>
+                  <a:txBody>
+                    <a:bodyPr/>
+                    <a:lstStyle/>
+                    <a:p>
+                      <a:endParaRPr lang="en-GB" dirty="0"/>
+                    </a:p>
+                  </a:txBody>
+                  <a:tcPr/>
+                </a:tc>
+                <a:extLst>
+                  <a:ext uri="{0D108BD9-81ED-4DB2-BD59-A6C34878D82A}">
+                    <a16:rowId xmlns:a16="http://schemas.microsoft.com/office/drawing/2014/main" val="2232296025"/>
+                  </a:ext>
+                </a:extLst>
+              </a:tr>
+              <a:tr h="790435">
+                <a:tc>
+                  <a:txBody>
+                    <a:bodyPr/>
+                    <a:lstStyle/>
+                    <a:p>
+                      <a:pPr marL="0" marR="0" lvl="0" indent="0" algn="l" defTabSz="914400" rtl="0" eaLnBrk="1" fontAlgn="auto" latinLnBrk="0" hangingPunct="1">
+                        <a:lnSpc>
+                          <a:spcPct val="100000"/>
+                        </a:lnSpc>
+                        <a:spcBef>
+                          <a:spcPts val="0"/>
+                        </a:spcBef>
+                        <a:spcAft>
+                          <a:spcPts val="0"/>
+                        </a:spcAft>
+                        <a:buClrTx/>
+                        <a:buSzTx/>
+                        <a:buFontTx/>
+                        <a:buNone/>
+                        <a:tabLst/>
+                        <a:defRPr/>
+                      </a:pPr>
+                      <a:r>
+                        <a:rPr lang="en-GB" dirty="0"/>
+                        <a:t>DDQN n=1, discount=0.904</a:t>
+                      </a:r>
+                    </a:p>
+                  </a:txBody>
+                  <a:tcPr/>
+                </a:tc>
+                <a:tc>
+                  <a:txBody>
+                    <a:bodyPr/>
+                    <a:lstStyle/>
+                    <a:p>
+                      <a:r>
+                        <a:rPr lang="en-GB" dirty="0"/>
+                        <a:t>4.6%</a:t>
+                      </a:r>
+                    </a:p>
+                  </a:txBody>
+                  <a:tcPr/>
+                </a:tc>
+                <a:tc>
+                  <a:txBody>
+                    <a:bodyPr/>
+                    <a:lstStyle/>
+                    <a:p>
+                      <a:r>
+                        <a:rPr lang="en-GB" dirty="0"/>
+                        <a:t>2.4%</a:t>
+                      </a:r>
+                    </a:p>
+                  </a:txBody>
+                  <a:tcPr/>
+                </a:tc>
+                <a:tc>
+                  <a:txBody>
+                    <a:bodyPr/>
+                    <a:lstStyle/>
+                    <a:p>
+                      <a:endParaRPr lang="en-GB" dirty="0"/>
+                    </a:p>
+                  </a:txBody>
+                  <a:tcPr/>
+                </a:tc>
+                <a:extLst>
+                  <a:ext uri="{0D108BD9-81ED-4DB2-BD59-A6C34878D82A}">
+                    <a16:rowId xmlns:a16="http://schemas.microsoft.com/office/drawing/2014/main" val="723787262"/>
+                  </a:ext>
+                </a:extLst>
+              </a:tr>
+              <a:tr h="1129193">
+                <a:tc>
+                  <a:txBody>
+                    <a:bodyPr/>
+                    <a:lstStyle/>
+                    <a:p>
+                      <a:pPr marL="0" marR="0" lvl="0" indent="0" algn="l" defTabSz="914400" rtl="0" eaLnBrk="1" fontAlgn="auto" latinLnBrk="0" hangingPunct="1">
+                        <a:lnSpc>
+                          <a:spcPct val="100000"/>
+                        </a:lnSpc>
+                        <a:spcBef>
+                          <a:spcPts val="0"/>
+                        </a:spcBef>
+                        <a:spcAft>
+                          <a:spcPts val="0"/>
+                        </a:spcAft>
+                        <a:buClrTx/>
+                        <a:buSzTx/>
+                        <a:buFontTx/>
+                        <a:buNone/>
+                        <a:tabLst/>
+                        <a:defRPr/>
+                      </a:pPr>
+                      <a:r>
+                        <a:rPr lang="en-GB" dirty="0"/>
+                        <a:t>DDQN n=10, discount=0.999</a:t>
+                      </a:r>
+                    </a:p>
+                    <a:p>
+                      <a:pPr marL="0" marR="0" lvl="0" indent="0" algn="l" defTabSz="914400" rtl="0" eaLnBrk="1" fontAlgn="auto" latinLnBrk="0" hangingPunct="1">
+                        <a:lnSpc>
+                          <a:spcPct val="100000"/>
+                        </a:lnSpc>
+                        <a:spcBef>
+                          <a:spcPts val="0"/>
+                        </a:spcBef>
+                        <a:spcAft>
+                          <a:spcPts val="0"/>
+                        </a:spcAft>
+                        <a:buClrTx/>
+                        <a:buSzTx/>
+                        <a:buFontTx/>
+                        <a:buNone/>
+                        <a:tabLst/>
+                        <a:defRPr/>
+                      </a:pPr>
+                      <a:endParaRPr lang="en-GB" dirty="0"/>
+                    </a:p>
+                  </a:txBody>
+                  <a:tcPr/>
+                </a:tc>
+                <a:tc>
+                  <a:txBody>
+                    <a:bodyPr/>
+                    <a:lstStyle/>
+                    <a:p>
+                      <a:r>
+                        <a:rPr lang="en-GB" dirty="0"/>
+                        <a:t>4%</a:t>
+                      </a:r>
+                    </a:p>
+                  </a:txBody>
+                  <a:tcPr/>
+                </a:tc>
+                <a:tc>
+                  <a:txBody>
+                    <a:bodyPr/>
+                    <a:lstStyle/>
+                    <a:p>
+                      <a:r>
+                        <a:rPr lang="en-GB" dirty="0"/>
+                        <a:t>1.5%</a:t>
+                      </a:r>
+                    </a:p>
+                  </a:txBody>
+                  <a:tcPr/>
+                </a:tc>
+                <a:tc>
+                  <a:txBody>
+                    <a:bodyPr/>
+                    <a:lstStyle/>
+                    <a:p>
+                      <a:endParaRPr lang="en-GB" dirty="0"/>
+                    </a:p>
+                  </a:txBody>
+                  <a:tcPr/>
+                </a:tc>
+                <a:extLst>
+                  <a:ext uri="{0D108BD9-81ED-4DB2-BD59-A6C34878D82A}">
+                    <a16:rowId xmlns:a16="http://schemas.microsoft.com/office/drawing/2014/main" val="886877885"/>
+                  </a:ext>
+                </a:extLst>
+              </a:tr>
+            </a:tbl>
+          </a:graphicData>
+        </a:graphic>
+      </p:graphicFrame>
+    </p:spTree>
+    <p:extLst>
+      <p:ext uri="{BB962C8B-B14F-4D97-AF65-F5344CB8AC3E}">
+        <p14:creationId xmlns:p14="http://schemas.microsoft.com/office/powerpoint/2010/main" val="1902870085"/>
+      </p:ext>
+    </p:extLst>
+  </p:cSld>
+  <p:clrMapOvr>
+    <a:masterClrMapping/>
+  </p:clrMapOvr>
+</p:sld>
+</file>
+
+<file path=ppt/slides/slide7.xml><?xml version="1.0" encoding="utf-8"?>
 <p:sld xmlns:a="http://schemas.openxmlformats.org/drawingml/2006/main" xmlns:r="http://schemas.openxmlformats.org/officeDocument/2006/relationships" xmlns:p="http://schemas.openxmlformats.org/presentationml/2006/main">
   <p:cSld>
     <p:spTree>
@@ -8315,7 +9132,7 @@
 </p:sld>
 </file>
 
-<file path=ppt/slides/slide7.xml><?xml version="1.0" encoding="utf-8"?>
+<file path=ppt/slides/slide8.xml><?xml version="1.0" encoding="utf-8"?>
 <p:sld xmlns:a="http://schemas.openxmlformats.org/drawingml/2006/main" xmlns:r="http://schemas.openxmlformats.org/officeDocument/2006/relationships" xmlns:p="http://schemas.openxmlformats.org/presentationml/2006/main">
   <p:cSld>
     <p:spTree>
@@ -8443,7 +9260,7 @@
 </p:sld>
 </file>
 
-<file path=ppt/slides/slide8.xml><?xml version="1.0" encoding="utf-8"?>
+<file path=ppt/slides/slide9.xml><?xml version="1.0" encoding="utf-8"?>
 <p:sld xmlns:a="http://schemas.openxmlformats.org/drawingml/2006/main" xmlns:r="http://schemas.openxmlformats.org/officeDocument/2006/relationships" xmlns:p="http://schemas.openxmlformats.org/presentationml/2006/main">
   <p:cSld>
     <p:spTree>
@@ -8509,14 +9326,14 @@
             <p:ph idx="1"/>
             <p:extLst>
               <p:ext uri="{D42A27DB-BD31-4B8C-83A1-F6EECF244321}">
-                <p14:modId xmlns:p14="http://schemas.microsoft.com/office/powerpoint/2010/main" val="983385370"/>
+                <p14:modId xmlns:p14="http://schemas.microsoft.com/office/powerpoint/2010/main" val="2573941933"/>
               </p:ext>
             </p:extLst>
           </p:nvPr>
         </p:nvGraphicFramePr>
         <p:xfrm>
-          <a:off x="510181" y="1084905"/>
-          <a:ext cx="10497939" cy="5375107"/>
+          <a:off x="364669" y="1012695"/>
+          <a:ext cx="10497939" cy="5232556"/>
         </p:xfrm>
         <a:graphic>
           <a:graphicData uri="http://schemas.openxmlformats.org/drawingml/2006/table">
@@ -8574,18 +9391,18 @@
                     <a:bodyPr/>
                     <a:lstStyle/>
                     <a:p>
-                      <a:endParaRPr lang="en-GB" sz="1400" dirty="0"/>
-                    </a:p>
-                  </a:txBody>
-                  <a:tcPr/>
-                </a:tc>
-                <a:tc>
-                  <a:txBody>
-                    <a:bodyPr/>
-                    <a:lstStyle/>
-                    <a:p>
-                      <a:r>
-                        <a:rPr lang="en-GB" dirty="0"/>
+                      <a:endParaRPr lang="en-GB" sz="1050" dirty="0"/>
+                    </a:p>
+                  </a:txBody>
+                  <a:tcPr/>
+                </a:tc>
+                <a:tc>
+                  <a:txBody>
+                    <a:bodyPr/>
+                    <a:lstStyle/>
+                    <a:p>
+                      <a:r>
+                        <a:rPr lang="en-GB" sz="1200" dirty="0"/>
                         <a:t>Early Churn</a:t>
                       </a:r>
                     </a:p>
@@ -8598,7 +9415,7 @@
                     <a:lstStyle/>
                     <a:p>
                       <a:r>
-                        <a:rPr lang="en-GB" dirty="0"/>
+                        <a:rPr lang="en-GB" sz="1200" dirty="0"/>
                         <a:t>Late Churn</a:t>
                       </a:r>
                     </a:p>
@@ -8611,7 +9428,7 @@
                     <a:lstStyle/>
                     <a:p>
                       <a:r>
-                        <a:rPr lang="en-GB" dirty="0"/>
+                        <a:rPr lang="en-GB" sz="1200" dirty="0"/>
                         <a:t>Performance</a:t>
                       </a:r>
                     </a:p>
@@ -8624,7 +9441,7 @@
                     <a:lstStyle/>
                     <a:p>
                       <a:r>
-                        <a:rPr lang="en-GB" dirty="0"/>
+                        <a:rPr lang="en-GB" sz="1200" dirty="0"/>
                         <a:t>0% Churn Rate Early</a:t>
                       </a:r>
                     </a:p>
@@ -8637,7 +9454,7 @@
                     <a:lstStyle/>
                     <a:p>
                       <a:r>
-                        <a:rPr lang="en-GB" dirty="0"/>
+                        <a:rPr lang="en-GB" sz="1200" dirty="0"/>
                         <a:t>0% Churn Rate Late</a:t>
                       </a:r>
                     </a:p>
@@ -8657,20 +9474,20 @@
                     <a:lstStyle/>
                     <a:p>
                       <a:r>
+                        <a:rPr lang="en-GB" sz="1000" dirty="0"/>
+                        <a:t>DDQN</a:t>
+                      </a:r>
+                    </a:p>
+                  </a:txBody>
+                  <a:tcPr/>
+                </a:tc>
+                <a:tc>
+                  <a:txBody>
+                    <a:bodyPr/>
+                    <a:lstStyle/>
+                    <a:p>
+                      <a:r>
                         <a:rPr lang="en-GB" sz="1200" dirty="0"/>
-                        <a:t>DDQN</a:t>
-                      </a:r>
-                    </a:p>
-                  </a:txBody>
-                  <a:tcPr/>
-                </a:tc>
-                <a:tc>
-                  <a:txBody>
-                    <a:bodyPr/>
-                    <a:lstStyle/>
-                    <a:p>
-                      <a:r>
-                        <a:rPr lang="en-GB" dirty="0"/>
                         <a:t>3.8%</a:t>
                       </a:r>
                     </a:p>
@@ -8683,7 +9500,7 @@
                     <a:lstStyle/>
                     <a:p>
                       <a:r>
-                        <a:rPr lang="en-GB" dirty="0"/>
+                        <a:rPr lang="en-GB" sz="1200" dirty="0"/>
                         <a:t>1.9%</a:t>
                       </a:r>
                     </a:p>
@@ -8696,20 +9513,20 @@
                     <a:lstStyle/>
                     <a:p>
                       <a:r>
-                        <a:rPr lang="en-GB" dirty="0"/>
-                        <a:t>?</a:t>
-                      </a:r>
-                    </a:p>
-                  </a:txBody>
-                  <a:tcPr/>
-                </a:tc>
-                <a:tc>
-                  <a:txBody>
-                    <a:bodyPr/>
-                    <a:lstStyle/>
-                    <a:p>
-                      <a:r>
-                        <a:rPr lang="en-GB" dirty="0"/>
+                        <a:rPr lang="en-GB" sz="1200" dirty="0"/>
+                        <a:t>0.096</a:t>
+                      </a:r>
+                    </a:p>
+                  </a:txBody>
+                  <a:tcPr/>
+                </a:tc>
+                <a:tc>
+                  <a:txBody>
+                    <a:bodyPr/>
+                    <a:lstStyle/>
+                    <a:p>
+                      <a:r>
+                        <a:rPr lang="en-GB" sz="1200" dirty="0"/>
                         <a:t>9.1%</a:t>
                       </a:r>
                     </a:p>
@@ -8722,7 +9539,7 @@
                     <a:lstStyle/>
                     <a:p>
                       <a:r>
-                        <a:rPr lang="en-GB" dirty="0"/>
+                        <a:rPr lang="en-GB" sz="1200" dirty="0"/>
                         <a:t>0%</a:t>
                       </a:r>
                     </a:p>
@@ -8742,20 +9559,20 @@
                     <a:lstStyle/>
                     <a:p>
                       <a:r>
+                        <a:rPr lang="en-GB" sz="1000" dirty="0"/>
+                        <a:t>DDQN bs=16</a:t>
+                      </a:r>
+                    </a:p>
+                  </a:txBody>
+                  <a:tcPr/>
+                </a:tc>
+                <a:tc>
+                  <a:txBody>
+                    <a:bodyPr/>
+                    <a:lstStyle/>
+                    <a:p>
+                      <a:r>
                         <a:rPr lang="en-GB" sz="1200" dirty="0"/>
-                        <a:t>DDQN bs=16</a:t>
-                      </a:r>
-                    </a:p>
-                  </a:txBody>
-                  <a:tcPr/>
-                </a:tc>
-                <a:tc>
-                  <a:txBody>
-                    <a:bodyPr/>
-                    <a:lstStyle/>
-                    <a:p>
-                      <a:r>
-                        <a:rPr lang="en-GB" dirty="0"/>
                         <a:t>3.2%</a:t>
                       </a:r>
                     </a:p>
@@ -8768,7 +9585,7 @@
                     <a:lstStyle/>
                     <a:p>
                       <a:r>
-                        <a:rPr lang="en-GB" dirty="0"/>
+                        <a:rPr lang="en-GB" sz="1200" dirty="0"/>
                         <a:t>1.6%</a:t>
                       </a:r>
                     </a:p>
@@ -8781,7 +9598,7 @@
                     <a:lstStyle/>
                     <a:p>
                       <a:r>
-                        <a:rPr lang="en-GB" dirty="0"/>
+                        <a:rPr lang="en-GB" sz="1200" dirty="0"/>
                         <a:t>0.104</a:t>
                       </a:r>
                     </a:p>
@@ -8794,7 +9611,7 @@
                     <a:lstStyle/>
                     <a:p>
                       <a:r>
-                        <a:rPr lang="en-GB" dirty="0"/>
+                        <a:rPr lang="en-GB" sz="1200" dirty="0"/>
                         <a:t>14.8%</a:t>
                       </a:r>
                     </a:p>
@@ -8807,7 +9624,7 @@
                     <a:lstStyle/>
                     <a:p>
                       <a:r>
-                        <a:rPr lang="en-GB" dirty="0"/>
+                        <a:rPr lang="en-GB" sz="1200" dirty="0"/>
                         <a:t>0%</a:t>
                       </a:r>
                     </a:p>
@@ -8827,20 +9644,20 @@
                     <a:lstStyle/>
                     <a:p>
                       <a:r>
+                        <a:rPr lang="en-GB" sz="1000" dirty="0"/>
+                        <a:t>DDQN discount=0.999</a:t>
+                      </a:r>
+                    </a:p>
+                  </a:txBody>
+                  <a:tcPr/>
+                </a:tc>
+                <a:tc>
+                  <a:txBody>
+                    <a:bodyPr/>
+                    <a:lstStyle/>
+                    <a:p>
+                      <a:r>
                         <a:rPr lang="en-GB" sz="1200" dirty="0"/>
-                        <a:t>DDQN discount=0.999</a:t>
-                      </a:r>
-                    </a:p>
-                  </a:txBody>
-                  <a:tcPr/>
-                </a:tc>
-                <a:tc>
-                  <a:txBody>
-                    <a:bodyPr/>
-                    <a:lstStyle/>
-                    <a:p>
-                      <a:r>
-                        <a:rPr lang="en-GB" dirty="0"/>
                         <a:t>4.9%</a:t>
                       </a:r>
                     </a:p>
@@ -8853,7 +9670,7 @@
                     <a:lstStyle/>
                     <a:p>
                       <a:r>
-                        <a:rPr lang="en-GB" dirty="0"/>
+                        <a:rPr lang="en-GB" sz="1200" dirty="0"/>
                         <a:t>2.5%</a:t>
                       </a:r>
                     </a:p>
@@ -8866,7 +9683,7 @@
                     <a:lstStyle/>
                     <a:p>
                       <a:r>
-                        <a:rPr lang="en-GB" dirty="0"/>
+                        <a:rPr lang="en-GB" sz="1200" dirty="0"/>
                         <a:t>0.074</a:t>
                       </a:r>
                     </a:p>
@@ -8879,7 +9696,7 @@
                     <a:lstStyle/>
                     <a:p>
                       <a:r>
-                        <a:rPr lang="en-GB" dirty="0"/>
+                        <a:rPr lang="en-GB" sz="1200" dirty="0"/>
                         <a:t>14.4%</a:t>
                       </a:r>
                     </a:p>
@@ -8892,7 +9709,7 @@
                     <a:lstStyle/>
                     <a:p>
                       <a:r>
-                        <a:rPr lang="en-GB" dirty="0"/>
+                        <a:rPr lang="en-GB" sz="1200" dirty="0"/>
                         <a:t>4.2%</a:t>
                       </a:r>
                     </a:p>
@@ -8929,7 +9746,7 @@
                         <a:defRPr/>
                       </a:pPr>
                       <a:r>
-                        <a:rPr lang="en-GB" sz="1200" dirty="0"/>
+                        <a:rPr lang="en-GB" sz="1000" dirty="0"/>
                         <a:t>DDQN</a:t>
                       </a:r>
                     </a:p>
@@ -8952,20 +9769,20 @@
                         <a:defRPr/>
                       </a:pPr>
                       <a:r>
+                        <a:rPr lang="en-GB" sz="1000" dirty="0"/>
+                        <a:t>Lr=0.00025</a:t>
+                      </a:r>
+                    </a:p>
+                  </a:txBody>
+                  <a:tcPr/>
+                </a:tc>
+                <a:tc>
+                  <a:txBody>
+                    <a:bodyPr/>
+                    <a:lstStyle/>
+                    <a:p>
+                      <a:r>
                         <a:rPr lang="en-GB" sz="1200" dirty="0"/>
-                        <a:t>Lr=0.00025</a:t>
-                      </a:r>
-                    </a:p>
-                  </a:txBody>
-                  <a:tcPr/>
-                </a:tc>
-                <a:tc>
-                  <a:txBody>
-                    <a:bodyPr/>
-                    <a:lstStyle/>
-                    <a:p>
-                      <a:r>
-                        <a:rPr lang="en-GB" dirty="0"/>
                         <a:t>3.8%</a:t>
                       </a:r>
                     </a:p>
@@ -8978,7 +9795,7 @@
                     <a:lstStyle/>
                     <a:p>
                       <a:r>
-                        <a:rPr lang="en-GB" dirty="0"/>
+                        <a:rPr lang="en-GB" sz="1200" dirty="0"/>
                         <a:t>1.7%</a:t>
                       </a:r>
                     </a:p>
@@ -8991,7 +9808,7 @@
                     <a:lstStyle/>
                     <a:p>
                       <a:r>
-                        <a:rPr lang="en-GB" dirty="0"/>
+                        <a:rPr lang="en-GB" sz="1200" dirty="0"/>
                         <a:t>0.061</a:t>
                       </a:r>
                     </a:p>
@@ -9004,7 +9821,7 @@
                     <a:lstStyle/>
                     <a:p>
                       <a:r>
-                        <a:rPr lang="en-GB" dirty="0"/>
+                        <a:rPr lang="en-GB" sz="1200" dirty="0"/>
                         <a:t>7.8%</a:t>
                       </a:r>
                     </a:p>
@@ -9017,7 +9834,7 @@
                     <a:lstStyle/>
                     <a:p>
                       <a:r>
-                        <a:rPr lang="en-GB" dirty="0"/>
+                        <a:rPr lang="en-GB" sz="1200" dirty="0"/>
                         <a:t>0%</a:t>
                       </a:r>
                     </a:p>
@@ -9037,20 +9854,20 @@
                     <a:lstStyle/>
                     <a:p>
                       <a:r>
+                        <a:rPr lang="en-GB" sz="1000" dirty="0"/>
+                        <a:t>DDQN n-step=3,</a:t>
+                      </a:r>
+                    </a:p>
+                  </a:txBody>
+                  <a:tcPr/>
+                </a:tc>
+                <a:tc>
+                  <a:txBody>
+                    <a:bodyPr/>
+                    <a:lstStyle/>
+                    <a:p>
+                      <a:r>
                         <a:rPr lang="en-GB" sz="1200" dirty="0"/>
-                        <a:t>DDQN n-step=3,</a:t>
-                      </a:r>
-                    </a:p>
-                  </a:txBody>
-                  <a:tcPr/>
-                </a:tc>
-                <a:tc>
-                  <a:txBody>
-                    <a:bodyPr/>
-                    <a:lstStyle/>
-                    <a:p>
-                      <a:r>
-                        <a:rPr lang="en-GB" dirty="0"/>
                         <a:t>5.6%</a:t>
                       </a:r>
                     </a:p>
@@ -9063,7 +9880,7 @@
                     <a:lstStyle/>
                     <a:p>
                       <a:r>
-                        <a:rPr lang="en-GB" dirty="0"/>
+                        <a:rPr lang="en-GB" sz="1200" dirty="0"/>
                         <a:t>2.8%</a:t>
                       </a:r>
                     </a:p>
@@ -9076,7 +9893,7 @@
                     <a:lstStyle/>
                     <a:p>
                       <a:r>
-                        <a:rPr lang="en-GB" dirty="0"/>
+                        <a:rPr lang="en-GB" sz="1200" dirty="0"/>
                         <a:t>0.127</a:t>
                       </a:r>
                     </a:p>
@@ -9089,7 +9906,7 @@
                     <a:lstStyle/>
                     <a:p>
                       <a:r>
-                        <a:rPr lang="en-GB" dirty="0"/>
+                        <a:rPr lang="en-GB" sz="1200" dirty="0"/>
                         <a:t>15.7%</a:t>
                       </a:r>
                     </a:p>
@@ -9102,7 +9919,7 @@
                     <a:lstStyle/>
                     <a:p>
                       <a:r>
-                        <a:rPr lang="en-GB" dirty="0"/>
+                        <a:rPr lang="en-GB" sz="1200" dirty="0"/>
                         <a:t>3.8%</a:t>
                       </a:r>
                     </a:p>
@@ -9122,20 +9939,20 @@
                     <a:lstStyle/>
                     <a:p>
                       <a:r>
+                        <a:rPr lang="en-GB" sz="1000" dirty="0"/>
+                        <a:t>DDQN n-step=1</a:t>
+                      </a:r>
+                    </a:p>
+                  </a:txBody>
+                  <a:tcPr/>
+                </a:tc>
+                <a:tc>
+                  <a:txBody>
+                    <a:bodyPr/>
+                    <a:lstStyle/>
+                    <a:p>
+                      <a:r>
                         <a:rPr lang="en-GB" sz="1200" dirty="0"/>
-                        <a:t>DDQN n-step=1</a:t>
-                      </a:r>
-                    </a:p>
-                  </a:txBody>
-                  <a:tcPr/>
-                </a:tc>
-                <a:tc>
-                  <a:txBody>
-                    <a:bodyPr/>
-                    <a:lstStyle/>
-                    <a:p>
-                      <a:r>
-                        <a:rPr lang="en-GB" dirty="0"/>
                         <a:t>10.9%</a:t>
                       </a:r>
                     </a:p>
@@ -9148,7 +9965,7 @@
                     <a:lstStyle/>
                     <a:p>
                       <a:r>
-                        <a:rPr lang="en-GB" dirty="0"/>
+                        <a:rPr lang="en-GB" sz="1200" dirty="0"/>
                         <a:t>5.7%</a:t>
                       </a:r>
                     </a:p>
@@ -9161,7 +9978,7 @@
                     <a:lstStyle/>
                     <a:p>
                       <a:r>
-                        <a:rPr lang="en-GB" dirty="0"/>
+                        <a:rPr lang="en-GB" sz="1200" dirty="0"/>
                         <a:t>0.036</a:t>
                       </a:r>
                     </a:p>
@@ -9174,7 +9991,7 @@
                     <a:lstStyle/>
                     <a:p>
                       <a:r>
-                        <a:rPr lang="en-GB" dirty="0"/>
+                        <a:rPr lang="en-GB" sz="1200" dirty="0"/>
                         <a:t>29.2%</a:t>
                       </a:r>
                     </a:p>
@@ -9187,7 +10004,7 @@
                     <a:lstStyle/>
                     <a:p>
                       <a:r>
-                        <a:rPr lang="en-GB" dirty="0"/>
+                        <a:rPr lang="en-GB" sz="1200" dirty="0"/>
                         <a:t>4.7%</a:t>
                       </a:r>
                     </a:p>
@@ -9207,20 +10024,20 @@
                     <a:lstStyle/>
                     <a:p>
                       <a:r>
+                        <a:rPr lang="en-GB" sz="1000" dirty="0"/>
+                        <a:t>DDQN n-step=20</a:t>
+                      </a:r>
+                    </a:p>
+                  </a:txBody>
+                  <a:tcPr/>
+                </a:tc>
+                <a:tc>
+                  <a:txBody>
+                    <a:bodyPr/>
+                    <a:lstStyle/>
+                    <a:p>
+                      <a:r>
                         <a:rPr lang="en-GB" sz="1200" dirty="0"/>
-                        <a:t>DDQN n-step=20</a:t>
-                      </a:r>
-                    </a:p>
-                  </a:txBody>
-                  <a:tcPr/>
-                </a:tc>
-                <a:tc>
-                  <a:txBody>
-                    <a:bodyPr/>
-                    <a:lstStyle/>
-                    <a:p>
-                      <a:r>
-                        <a:rPr lang="en-GB" dirty="0"/>
                         <a:t>3.2%</a:t>
                       </a:r>
                     </a:p>
@@ -9233,7 +10050,7 @@
                     <a:lstStyle/>
                     <a:p>
                       <a:r>
-                        <a:rPr lang="en-GB" dirty="0"/>
+                        <a:rPr lang="en-GB" sz="1200" dirty="0"/>
                         <a:t>1.6%</a:t>
                       </a:r>
                     </a:p>
@@ -9246,7 +10063,7 @@
                     <a:lstStyle/>
                     <a:p>
                       <a:r>
-                        <a:rPr lang="en-GB" dirty="0"/>
+                        <a:rPr lang="en-GB" sz="1200" dirty="0"/>
                         <a:t>0.055</a:t>
                       </a:r>
                     </a:p>
@@ -9259,7 +10076,7 @@
                     <a:lstStyle/>
                     <a:p>
                       <a:r>
-                        <a:rPr lang="en-GB" dirty="0"/>
+                        <a:rPr lang="en-GB" sz="1200" dirty="0"/>
                         <a:t>7.8%</a:t>
                       </a:r>
                     </a:p>
@@ -9272,7 +10089,7 @@
                     <a:lstStyle/>
                     <a:p>
                       <a:r>
-                        <a:rPr lang="en-GB" dirty="0"/>
+                        <a:rPr lang="en-GB" sz="1200" dirty="0"/>
                         <a:t>0%</a:t>
                       </a:r>
                     </a:p>
@@ -9292,41 +10109,41 @@
                     <a:lstStyle/>
                     <a:p>
                       <a:r>
+                        <a:rPr lang="en-GB" sz="1000" dirty="0"/>
+                        <a:t>DDQN </a:t>
+                      </a:r>
+                      <a:r>
+                        <a:rPr lang="en-GB" sz="1000" dirty="0" err="1"/>
+                        <a:t>mem_size</a:t>
+                      </a:r>
+                      <a:r>
+                        <a:rPr lang="en-GB" sz="1000" dirty="0"/>
+                        <a:t>=15k</a:t>
+                      </a:r>
+                    </a:p>
+                  </a:txBody>
+                  <a:tcPr/>
+                </a:tc>
+                <a:tc>
+                  <a:txBody>
+                    <a:bodyPr/>
+                    <a:lstStyle/>
+                    <a:p>
+                      <a:r>
                         <a:rPr lang="en-GB" sz="1200" dirty="0"/>
-                        <a:t>DDQN </a:t>
-                      </a:r>
-                      <a:r>
-                        <a:rPr lang="en-GB" sz="1200" dirty="0" err="1"/>
-                        <a:t>mem_size</a:t>
-                      </a:r>
+                        <a:t>3.7%</a:t>
+                      </a:r>
+                    </a:p>
+                  </a:txBody>
+                  <a:tcPr/>
+                </a:tc>
+                <a:tc>
+                  <a:txBody>
+                    <a:bodyPr/>
+                    <a:lstStyle/>
+                    <a:p>
                       <a:r>
                         <a:rPr lang="en-GB" sz="1200" dirty="0"/>
-                        <a:t>=15k</a:t>
-                      </a:r>
-                    </a:p>
-                  </a:txBody>
-                  <a:tcPr/>
-                </a:tc>
-                <a:tc>
-                  <a:txBody>
-                    <a:bodyPr/>
-                    <a:lstStyle/>
-                    <a:p>
-                      <a:r>
-                        <a:rPr lang="en-GB" dirty="0"/>
-                        <a:t>3.7%</a:t>
-                      </a:r>
-                    </a:p>
-                  </a:txBody>
-                  <a:tcPr/>
-                </a:tc>
-                <a:tc>
-                  <a:txBody>
-                    <a:bodyPr/>
-                    <a:lstStyle/>
-                    <a:p>
-                      <a:r>
-                        <a:rPr lang="en-GB" dirty="0"/>
                         <a:t>1.6%</a:t>
                       </a:r>
                     </a:p>
@@ -9339,7 +10156,7 @@
                     <a:lstStyle/>
                     <a:p>
                       <a:r>
-                        <a:rPr lang="en-GB" dirty="0"/>
+                        <a:rPr lang="en-GB" sz="1200" dirty="0"/>
                         <a:t>0.057</a:t>
                       </a:r>
                     </a:p>
@@ -9352,7 +10169,7 @@
                     <a:lstStyle/>
                     <a:p>
                       <a:r>
-                        <a:rPr lang="en-GB" dirty="0"/>
+                        <a:rPr lang="en-GB" sz="1200" dirty="0"/>
                         <a:t>8.1%</a:t>
                       </a:r>
                     </a:p>
@@ -9365,7 +10182,7 @@
                     <a:lstStyle/>
                     <a:p>
                       <a:r>
-                        <a:rPr lang="en-GB" dirty="0"/>
+                        <a:rPr lang="en-GB" sz="1200" dirty="0"/>
                         <a:t>0%</a:t>
                       </a:r>
                     </a:p>
@@ -9378,7 +10195,25 @@
                   </a:ext>
                 </a:extLst>
               </a:tr>
-              <a:tr h="561197">
+              <a:tr h="289429">
+                <a:tc>
+                  <a:txBody>
+                    <a:bodyPr/>
+                    <a:lstStyle/>
+                    <a:p>
+                      <a:r>
+                        <a:rPr lang="en-GB" sz="1000" dirty="0"/>
+                        <a:t>DDQN n=1 </a:t>
+                      </a:r>
+                      <a:r>
+                        <a:rPr lang="en-GB" sz="1000" dirty="0" err="1"/>
+                        <a:t>spread_high</a:t>
+                      </a:r>
+                      <a:endParaRPr lang="en-GB" sz="1000" dirty="0"/>
+                    </a:p>
+                  </a:txBody>
+                  <a:tcPr/>
+                </a:tc>
                 <a:tc>
                   <a:txBody>
                     <a:bodyPr/>
@@ -9386,24 +10221,6 @@
                     <a:p>
                       <a:r>
                         <a:rPr lang="en-GB" sz="1200" dirty="0"/>
-                        <a:t>DDQN n=1 </a:t>
-                      </a:r>
-                      <a:r>
-                        <a:rPr lang="en-GB" sz="1200" dirty="0" err="1"/>
-                        <a:t>spread_high</a:t>
-                      </a:r>
-                      <a:endParaRPr lang="en-GB" sz="1200" dirty="0"/>
-                    </a:p>
-                  </a:txBody>
-                  <a:tcPr/>
-                </a:tc>
-                <a:tc>
-                  <a:txBody>
-                    <a:bodyPr/>
-                    <a:lstStyle/>
-                    <a:p>
-                      <a:r>
-                        <a:rPr lang="en-GB" dirty="0"/>
                         <a:t>11.3%</a:t>
                       </a:r>
                     </a:p>
@@ -9416,7 +10233,7 @@
                     <a:lstStyle/>
                     <a:p>
                       <a:r>
-                        <a:rPr lang="en-GB" dirty="0"/>
+                        <a:rPr lang="en-GB" sz="1200" dirty="0"/>
                         <a:t>5.5%</a:t>
                       </a:r>
                     </a:p>
@@ -9429,7 +10246,7 @@
                     <a:lstStyle/>
                     <a:p>
                       <a:r>
-                        <a:rPr lang="en-GB" dirty="0"/>
+                        <a:rPr lang="en-GB" sz="1200" dirty="0"/>
                         <a:t>0.043</a:t>
                       </a:r>
                     </a:p>
@@ -9442,7 +10259,7 @@
                     <a:lstStyle/>
                     <a:p>
                       <a:r>
-                        <a:rPr lang="en-GB" dirty="0"/>
+                        <a:rPr lang="en-GB" sz="1200" dirty="0"/>
                         <a:t>30.1%</a:t>
                       </a:r>
                     </a:p>
@@ -9455,7 +10272,7 @@
                     <a:lstStyle/>
                     <a:p>
                       <a:r>
-                        <a:rPr lang="en-GB" dirty="0"/>
+                        <a:rPr lang="en-GB" sz="1200" dirty="0"/>
                         <a:t>4.4%</a:t>
                       </a:r>
                     </a:p>
@@ -9468,7 +10285,20 @@
                   </a:ext>
                 </a:extLst>
               </a:tr>
-              <a:tr h="561197">
+              <a:tr h="316629">
+                <a:tc>
+                  <a:txBody>
+                    <a:bodyPr/>
+                    <a:lstStyle/>
+                    <a:p>
+                      <a:r>
+                        <a:rPr lang="en-GB" sz="1000" dirty="0"/>
+                        <a:t>DDQN n=1, discount=0.904</a:t>
+                      </a:r>
+                    </a:p>
+                  </a:txBody>
+                  <a:tcPr/>
+                </a:tc>
                 <a:tc>
                   <a:txBody>
                     <a:bodyPr/>
@@ -9476,19 +10306,6 @@
                     <a:p>
                       <a:r>
                         <a:rPr lang="en-GB" sz="1200" dirty="0"/>
-                        <a:t>DDQN n=1, discount=0.904</a:t>
-                      </a:r>
-                    </a:p>
-                  </a:txBody>
-                  <a:tcPr/>
-                </a:tc>
-                <a:tc>
-                  <a:txBody>
-                    <a:bodyPr/>
-                    <a:lstStyle/>
-                    <a:p>
-                      <a:r>
-                        <a:rPr lang="en-GB" dirty="0"/>
                         <a:t>4.6%</a:t>
                       </a:r>
                     </a:p>
@@ -9501,7 +10318,7 @@
                     <a:lstStyle/>
                     <a:p>
                       <a:r>
-                        <a:rPr lang="en-GB" dirty="0"/>
+                        <a:rPr lang="en-GB" sz="1200" dirty="0"/>
                         <a:t>2.4%</a:t>
                       </a:r>
                     </a:p>
@@ -9514,7 +10331,7 @@
                     <a:lstStyle/>
                     <a:p>
                       <a:r>
-                        <a:rPr lang="en-GB" dirty="0"/>
+                        <a:rPr lang="en-GB" sz="1200" dirty="0"/>
                         <a:t>0.126</a:t>
                       </a:r>
                     </a:p>
@@ -9527,7 +10344,7 @@
                     <a:lstStyle/>
                     <a:p>
                       <a:r>
-                        <a:rPr lang="en-GB" dirty="0"/>
+                        <a:rPr lang="en-GB" sz="1200" dirty="0"/>
                         <a:t>12.8%</a:t>
                       </a:r>
                     </a:p>
@@ -9540,7 +10357,7 @@
                     <a:lstStyle/>
                     <a:p>
                       <a:r>
-                        <a:rPr lang="en-GB" dirty="0"/>
+                        <a:rPr lang="en-GB" sz="1200" dirty="0"/>
                         <a:t>0%</a:t>
                       </a:r>
                     </a:p>
@@ -9553,7 +10370,20 @@
                   </a:ext>
                 </a:extLst>
               </a:tr>
-              <a:tr h="561197">
+              <a:tr h="363706">
+                <a:tc>
+                  <a:txBody>
+                    <a:bodyPr/>
+                    <a:lstStyle/>
+                    <a:p>
+                      <a:r>
+                        <a:rPr lang="en-GB" sz="1000" dirty="0"/>
+                        <a:t>DDQN Augmentations</a:t>
+                      </a:r>
+                    </a:p>
+                  </a:txBody>
+                  <a:tcPr/>
+                </a:tc>
                 <a:tc>
                   <a:txBody>
                     <a:bodyPr/>
@@ -9561,19 +10391,6 @@
                     <a:p>
                       <a:r>
                         <a:rPr lang="en-GB" sz="1200" dirty="0"/>
-                        <a:t>DDQN Augmentations</a:t>
-                      </a:r>
-                    </a:p>
-                  </a:txBody>
-                  <a:tcPr/>
-                </a:tc>
-                <a:tc>
-                  <a:txBody>
-                    <a:bodyPr/>
-                    <a:lstStyle/>
-                    <a:p>
-                      <a:r>
-                        <a:rPr lang="en-GB" dirty="0"/>
                         <a:t>3.3%</a:t>
                       </a:r>
                     </a:p>
@@ -9586,7 +10403,7 @@
                     <a:lstStyle/>
                     <a:p>
                       <a:r>
-                        <a:rPr lang="en-GB" dirty="0"/>
+                        <a:rPr lang="en-GB" sz="1200" dirty="0"/>
                         <a:t>1.6%</a:t>
                       </a:r>
                     </a:p>
@@ -9599,7 +10416,7 @@
                     <a:lstStyle/>
                     <a:p>
                       <a:r>
-                        <a:rPr lang="en-GB" dirty="0"/>
+                        <a:rPr lang="en-GB" sz="1200" dirty="0"/>
                         <a:t>0.160</a:t>
                       </a:r>
                     </a:p>
@@ -9612,7 +10429,7 @@
                     <a:lstStyle/>
                     <a:p>
                       <a:r>
-                        <a:rPr lang="en-GB" dirty="0"/>
+                        <a:rPr lang="en-GB" sz="1200" dirty="0"/>
                         <a:t>19.4%</a:t>
                       </a:r>
                     </a:p>
@@ -9625,7 +10442,7 @@
                     <a:lstStyle/>
                     <a:p>
                       <a:r>
-                        <a:rPr lang="en-GB" dirty="0"/>
+                        <a:rPr lang="en-GB" sz="1200" dirty="0"/>
                         <a:t>4.0%</a:t>
                       </a:r>
                     </a:p>
@@ -9635,6 +10452,231 @@
                 <a:extLst>
                   <a:ext uri="{0D108BD9-81ED-4DB2-BD59-A6C34878D82A}">
                     <a16:rowId xmlns:a16="http://schemas.microsoft.com/office/drawing/2014/main" val="2462069891"/>
+                  </a:ext>
+                </a:extLst>
+              </a:tr>
+              <a:tr h="313578">
+                <a:tc>
+                  <a:txBody>
+                    <a:bodyPr/>
+                    <a:lstStyle/>
+                    <a:p>
+                      <a:r>
+                        <a:rPr lang="en-GB" sz="1000" dirty="0"/>
+                        <a:t>DDDQN</a:t>
+                      </a:r>
+                    </a:p>
+                  </a:txBody>
+                  <a:tcPr/>
+                </a:tc>
+                <a:tc>
+                  <a:txBody>
+                    <a:bodyPr/>
+                    <a:lstStyle/>
+                    <a:p>
+                      <a:r>
+                        <a:rPr lang="en-GB" sz="1200" dirty="0"/>
+                        <a:t>2.2%</a:t>
+                      </a:r>
+                    </a:p>
+                  </a:txBody>
+                  <a:tcPr/>
+                </a:tc>
+                <a:tc>
+                  <a:txBody>
+                    <a:bodyPr/>
+                    <a:lstStyle/>
+                    <a:p>
+                      <a:r>
+                        <a:rPr lang="en-GB" sz="1200" dirty="0"/>
+                        <a:t>1.3%</a:t>
+                      </a:r>
+                    </a:p>
+                  </a:txBody>
+                  <a:tcPr/>
+                </a:tc>
+                <a:tc>
+                  <a:txBody>
+                    <a:bodyPr/>
+                    <a:lstStyle/>
+                    <a:p>
+                      <a:r>
+                        <a:rPr lang="en-GB" sz="1200" dirty="0"/>
+                        <a:t>0.075</a:t>
+                      </a:r>
+                    </a:p>
+                  </a:txBody>
+                  <a:tcPr/>
+                </a:tc>
+                <a:tc>
+                  <a:txBody>
+                    <a:bodyPr/>
+                    <a:lstStyle/>
+                    <a:p>
+                      <a:r>
+                        <a:rPr lang="en-GB" sz="1200" dirty="0"/>
+                        <a:t>8%</a:t>
+                      </a:r>
+                    </a:p>
+                  </a:txBody>
+                  <a:tcPr/>
+                </a:tc>
+                <a:tc>
+                  <a:txBody>
+                    <a:bodyPr/>
+                    <a:lstStyle/>
+                    <a:p>
+                      <a:r>
+                        <a:rPr lang="en-GB" sz="1200" dirty="0"/>
+                        <a:t>0%</a:t>
+                      </a:r>
+                    </a:p>
+                  </a:txBody>
+                  <a:tcPr/>
+                </a:tc>
+                <a:extLst>
+                  <a:ext uri="{0D108BD9-81ED-4DB2-BD59-A6C34878D82A}">
+                    <a16:rowId xmlns:a16="http://schemas.microsoft.com/office/drawing/2014/main" val="2763395851"/>
+                  </a:ext>
+                </a:extLst>
+              </a:tr>
+              <a:tr h="301021">
+                <a:tc>
+                  <a:txBody>
+                    <a:bodyPr/>
+                    <a:lstStyle/>
+                    <a:p>
+                      <a:r>
+                        <a:rPr lang="en-GB" sz="1000" dirty="0"/>
+                        <a:t>DDQN target update=16</a:t>
+                      </a:r>
+                    </a:p>
+                  </a:txBody>
+                  <a:tcPr/>
+                </a:tc>
+                <a:tc>
+                  <a:txBody>
+                    <a:bodyPr/>
+                    <a:lstStyle/>
+                    <a:p>
+                      <a:endParaRPr lang="en-GB" sz="1200" dirty="0"/>
+                    </a:p>
+                  </a:txBody>
+                  <a:tcPr/>
+                </a:tc>
+                <a:tc>
+                  <a:txBody>
+                    <a:bodyPr/>
+                    <a:lstStyle/>
+                    <a:p>
+                      <a:endParaRPr lang="en-GB" sz="1200" dirty="0"/>
+                    </a:p>
+                  </a:txBody>
+                  <a:tcPr/>
+                </a:tc>
+                <a:tc>
+                  <a:txBody>
+                    <a:bodyPr/>
+                    <a:lstStyle/>
+                    <a:p>
+                      <a:endParaRPr lang="en-GB" sz="1200" dirty="0"/>
+                    </a:p>
+                  </a:txBody>
+                  <a:tcPr/>
+                </a:tc>
+                <a:tc>
+                  <a:txBody>
+                    <a:bodyPr/>
+                    <a:lstStyle/>
+                    <a:p>
+                      <a:endParaRPr lang="en-GB" sz="1200" dirty="0"/>
+                    </a:p>
+                  </a:txBody>
+                  <a:tcPr/>
+                </a:tc>
+                <a:tc>
+                  <a:txBody>
+                    <a:bodyPr/>
+                    <a:lstStyle/>
+                    <a:p>
+                      <a:endParaRPr lang="en-GB" sz="1200" dirty="0"/>
+                    </a:p>
+                  </a:txBody>
+                  <a:tcPr/>
+                </a:tc>
+                <a:extLst>
+                  <a:ext uri="{0D108BD9-81ED-4DB2-BD59-A6C34878D82A}">
+                    <a16:rowId xmlns:a16="http://schemas.microsoft.com/office/drawing/2014/main" val="3569701499"/>
+                  </a:ext>
+                </a:extLst>
+              </a:tr>
+              <a:tr h="561197">
+                <a:tc>
+                  <a:txBody>
+                    <a:bodyPr/>
+                    <a:lstStyle/>
+                    <a:p>
+                      <a:r>
+                        <a:rPr lang="en-GB" sz="1000" dirty="0"/>
+                        <a:t>DDQN Update Interval=4</a:t>
+                      </a:r>
+                    </a:p>
+                  </a:txBody>
+                  <a:tcPr/>
+                </a:tc>
+                <a:tc>
+                  <a:txBody>
+                    <a:bodyPr/>
+                    <a:lstStyle/>
+                    <a:p>
+                      <a:endParaRPr lang="en-GB" sz="1200" dirty="0"/>
+                    </a:p>
+                  </a:txBody>
+                  <a:tcPr/>
+                </a:tc>
+                <a:tc>
+                  <a:txBody>
+                    <a:bodyPr/>
+                    <a:lstStyle/>
+                    <a:p>
+                      <a:endParaRPr lang="en-GB" sz="1200" dirty="0"/>
+                    </a:p>
+                  </a:txBody>
+                  <a:tcPr/>
+                </a:tc>
+                <a:tc>
+                  <a:txBody>
+                    <a:bodyPr/>
+                    <a:lstStyle/>
+                    <a:p>
+                      <a:endParaRPr lang="en-GB" sz="1200" dirty="0"/>
+                    </a:p>
+                  </a:txBody>
+                  <a:tcPr/>
+                </a:tc>
+                <a:tc>
+                  <a:txBody>
+                    <a:bodyPr/>
+                    <a:lstStyle/>
+                    <a:p>
+                      <a:endParaRPr lang="en-GB" sz="1200" dirty="0"/>
+                    </a:p>
+                  </a:txBody>
+                  <a:tcPr/>
+                </a:tc>
+                <a:tc>
+                  <a:txBody>
+                    <a:bodyPr/>
+                    <a:lstStyle/>
+                    <a:p>
+                      <a:endParaRPr lang="en-GB" sz="1200" dirty="0"/>
+                    </a:p>
+                  </a:txBody>
+                  <a:tcPr/>
+                </a:tc>
+                <a:extLst>
+                  <a:ext uri="{0D108BD9-81ED-4DB2-BD59-A6C34878D82A}">
+                    <a16:rowId xmlns:a16="http://schemas.microsoft.com/office/drawing/2014/main" val="4041687575"/>
                   </a:ext>
                 </a:extLst>
               </a:tr>

</xml_diff>

<commit_message>
some last naming changes
</commit_message>
<xml_diff>
--- a/FeasibilityStudy_07_09_2023.pptx
+++ b/FeasibilityStudy_07_09_2023.pptx
@@ -1189,7 +1189,7 @@
           <a:p>
             <a:fld id="{02AC24A9-CCB6-4F8D-B8DB-C2F3692CFA5A}" type="datetimeFigureOut">
               <a:rPr lang="en-US" smtClean="0"/>
-              <a:t>9/25/2023</a:t>
+              <a:t>9/26/2023</a:t>
             </a:fld>
             <a:endParaRPr lang="en-US" dirty="0"/>
           </a:p>
@@ -1559,7 +1559,7 @@
           <a:p>
             <a:fld id="{02AC24A9-CCB6-4F8D-B8DB-C2F3692CFA5A}" type="datetimeFigureOut">
               <a:rPr lang="en-US" smtClean="0"/>
-              <a:t>9/25/2023</a:t>
+              <a:t>9/26/2023</a:t>
             </a:fld>
             <a:endParaRPr lang="en-US"/>
           </a:p>
@@ -1768,7 +1768,7 @@
           <a:p>
             <a:fld id="{02AC24A9-CCB6-4F8D-B8DB-C2F3692CFA5A}" type="datetimeFigureOut">
               <a:rPr lang="en-US" smtClean="0"/>
-              <a:t>9/25/2023</a:t>
+              <a:t>9/26/2023</a:t>
             </a:fld>
             <a:endParaRPr lang="en-US"/>
           </a:p>
@@ -2238,7 +2238,7 @@
           <a:p>
             <a:fld id="{02AC24A9-CCB6-4F8D-B8DB-C2F3692CFA5A}" type="datetimeFigureOut">
               <a:rPr lang="en-US" smtClean="0"/>
-              <a:t>9/25/2023</a:t>
+              <a:t>9/26/2023</a:t>
             </a:fld>
             <a:endParaRPr lang="en-US"/>
           </a:p>
@@ -2692,7 +2692,7 @@
           <a:p>
             <a:fld id="{02AC24A9-CCB6-4F8D-B8DB-C2F3692CFA5A}" type="datetimeFigureOut">
               <a:rPr lang="en-US" smtClean="0"/>
-              <a:t>9/25/2023</a:t>
+              <a:t>9/26/2023</a:t>
             </a:fld>
             <a:endParaRPr lang="en-US"/>
           </a:p>
@@ -3224,7 +3224,7 @@
           <a:p>
             <a:fld id="{02AC24A9-CCB6-4F8D-B8DB-C2F3692CFA5A}" type="datetimeFigureOut">
               <a:rPr lang="en-US" smtClean="0"/>
-              <a:t>9/25/2023</a:t>
+              <a:t>9/26/2023</a:t>
             </a:fld>
             <a:endParaRPr lang="en-US"/>
           </a:p>
@@ -3923,7 +3923,7 @@
           <a:p>
             <a:fld id="{02AC24A9-CCB6-4F8D-B8DB-C2F3692CFA5A}" type="datetimeFigureOut">
               <a:rPr lang="en-US" smtClean="0"/>
-              <a:t>9/25/2023</a:t>
+              <a:t>9/26/2023</a:t>
             </a:fld>
             <a:endParaRPr lang="en-US"/>
           </a:p>
@@ -4252,7 +4252,7 @@
           <a:p>
             <a:fld id="{02AC24A9-CCB6-4F8D-B8DB-C2F3692CFA5A}" type="datetimeFigureOut">
               <a:rPr lang="en-US" smtClean="0"/>
-              <a:t>9/25/2023</a:t>
+              <a:t>9/26/2023</a:t>
             </a:fld>
             <a:endParaRPr lang="en-US"/>
           </a:p>
@@ -4365,7 +4365,7 @@
           <a:p>
             <a:fld id="{02AC24A9-CCB6-4F8D-B8DB-C2F3692CFA5A}" type="datetimeFigureOut">
               <a:rPr lang="en-US" smtClean="0"/>
-              <a:t>9/25/2023</a:t>
+              <a:t>9/26/2023</a:t>
             </a:fld>
             <a:endParaRPr lang="en-US"/>
           </a:p>
@@ -4860,7 +4860,7 @@
           <a:p>
             <a:fld id="{02AC24A9-CCB6-4F8D-B8DB-C2F3692CFA5A}" type="datetimeFigureOut">
               <a:rPr lang="en-US" smtClean="0"/>
-              <a:t>9/25/2023</a:t>
+              <a:t>9/26/2023</a:t>
             </a:fld>
             <a:endParaRPr lang="en-US" dirty="0"/>
           </a:p>
@@ -5337,7 +5337,7 @@
           <a:p>
             <a:fld id="{02AC24A9-CCB6-4F8D-B8DB-C2F3692CFA5A}" type="datetimeFigureOut">
               <a:rPr lang="en-US" smtClean="0"/>
-              <a:t>9/25/2023</a:t>
+              <a:t>9/26/2023</a:t>
             </a:fld>
             <a:endParaRPr lang="en-US"/>
           </a:p>
@@ -5580,7 +5580,7 @@
           <a:p>
             <a:fld id="{02AC24A9-CCB6-4F8D-B8DB-C2F3692CFA5A}" type="datetimeFigureOut">
               <a:rPr lang="en-US" smtClean="0"/>
-              <a:t>9/25/2023</a:t>
+              <a:t>9/26/2023</a:t>
             </a:fld>
             <a:endParaRPr lang="en-US"/>
           </a:p>
@@ -10899,6 +10899,14 @@
 </file>
 
 <file path=customXml/item1.xml><?xml version="1.0" encoding="utf-8"?>
+<p:properties xmlns:p="http://schemas.microsoft.com/office/2006/metadata/properties" xmlns:xsi="http://www.w3.org/2001/XMLSchema-instance" xmlns:pc="http://schemas.microsoft.com/office/infopath/2007/PartnerControls">
+  <documentManagement>
+    <_activity xmlns="d7f5a7ab-2def-40a3-afd2-85d03e8f423c" xsi:nil="true"/>
+  </documentManagement>
+</p:properties>
+</file>
+
+<file path=customXml/item2.xml><?xml version="1.0" encoding="utf-8"?>
 <ct:contentTypeSchema xmlns:ct="http://schemas.microsoft.com/office/2006/metadata/contentType" xmlns:ma="http://schemas.microsoft.com/office/2006/metadata/properties/metaAttributes" ct:_="" ma:_="" ma:contentTypeName="Document" ma:contentTypeID="0x01010080EA5B84DD74DE40B36E4BC6020E6D9F" ma:contentTypeVersion="14" ma:contentTypeDescription="Create a new document." ma:contentTypeScope="" ma:versionID="28de449c72a5e47c5202139f2bf51550">
   <xsd:schema xmlns:xsd="http://www.w3.org/2001/XMLSchema" xmlns:xs="http://www.w3.org/2001/XMLSchema" xmlns:p="http://schemas.microsoft.com/office/2006/metadata/properties" xmlns:ns3="d7f5a7ab-2def-40a3-afd2-85d03e8f423c" xmlns:ns4="bd5b3ce5-9684-4633-a08f-c606343f8864" targetNamespace="http://schemas.microsoft.com/office/2006/metadata/properties" ma:root="true" ma:fieldsID="129c7dcc6397faf9c08502e0001ef98d" ns3:_="" ns4:_="">
     <xsd:import namespace="d7f5a7ab-2def-40a3-afd2-85d03e8f423c"/>
@@ -11127,14 +11135,6 @@
 </ct:contentTypeSchema>
 </file>
 
-<file path=customXml/item2.xml><?xml version="1.0" encoding="utf-8"?>
-<p:properties xmlns:p="http://schemas.microsoft.com/office/2006/metadata/properties" xmlns:xsi="http://www.w3.org/2001/XMLSchema-instance" xmlns:pc="http://schemas.microsoft.com/office/infopath/2007/PartnerControls">
-  <documentManagement>
-    <_activity xmlns="d7f5a7ab-2def-40a3-afd2-85d03e8f423c" xsi:nil="true"/>
-  </documentManagement>
-</p:properties>
-</file>
-
 <file path=customXml/item3.xml><?xml version="1.0" encoding="utf-8"?>
 <?mso-contentType ?>
 <FormTemplates xmlns="http://schemas.microsoft.com/sharepoint/v3/contenttype/forms">
@@ -11145,6 +11145,23 @@
 </file>
 
 <file path=customXml/itemProps1.xml><?xml version="1.0" encoding="utf-8"?>
+<ds:datastoreItem xmlns:ds="http://schemas.openxmlformats.org/officeDocument/2006/customXml" ds:itemID="{79C4B124-6D81-4E57-9C18-D557619DF62D}">
+  <ds:schemaRefs>
+    <ds:schemaRef ds:uri="http://purl.org/dc/terms/"/>
+    <ds:schemaRef ds:uri="http://schemas.microsoft.com/office/2006/documentManagement/types"/>
+    <ds:schemaRef ds:uri="http://schemas.microsoft.com/office/2006/metadata/properties"/>
+    <ds:schemaRef ds:uri="bd5b3ce5-9684-4633-a08f-c606343f8864"/>
+    <ds:schemaRef ds:uri="http://schemas.microsoft.com/office/infopath/2007/PartnerControls"/>
+    <ds:schemaRef ds:uri="http://purl.org/dc/dcmitype/"/>
+    <ds:schemaRef ds:uri="http://purl.org/dc/elements/1.1/"/>
+    <ds:schemaRef ds:uri="http://www.w3.org/XML/1998/namespace"/>
+    <ds:schemaRef ds:uri="http://schemas.openxmlformats.org/package/2006/metadata/core-properties"/>
+    <ds:schemaRef ds:uri="d7f5a7ab-2def-40a3-afd2-85d03e8f423c"/>
+  </ds:schemaRefs>
+</ds:datastoreItem>
+</file>
+
+<file path=customXml/itemProps2.xml><?xml version="1.0" encoding="utf-8"?>
 <ds:datastoreItem xmlns:ds="http://schemas.openxmlformats.org/officeDocument/2006/customXml" ds:itemID="{62477F19-84E0-4B89-B81C-DC3E856BCFA1}">
   <ds:schemaRefs>
     <ds:schemaRef ds:uri="http://schemas.microsoft.com/office/2006/metadata/contentType"/>
@@ -11163,23 +11180,6 @@
 </ds:datastoreItem>
 </file>
 
-<file path=customXml/itemProps2.xml><?xml version="1.0" encoding="utf-8"?>
-<ds:datastoreItem xmlns:ds="http://schemas.openxmlformats.org/officeDocument/2006/customXml" ds:itemID="{79C4B124-6D81-4E57-9C18-D557619DF62D}">
-  <ds:schemaRefs>
-    <ds:schemaRef ds:uri="http://purl.org/dc/terms/"/>
-    <ds:schemaRef ds:uri="http://schemas.microsoft.com/office/2006/documentManagement/types"/>
-    <ds:schemaRef ds:uri="http://schemas.microsoft.com/office/2006/metadata/properties"/>
-    <ds:schemaRef ds:uri="bd5b3ce5-9684-4633-a08f-c606343f8864"/>
-    <ds:schemaRef ds:uri="http://schemas.microsoft.com/office/infopath/2007/PartnerControls"/>
-    <ds:schemaRef ds:uri="http://purl.org/dc/dcmitype/"/>
-    <ds:schemaRef ds:uri="http://purl.org/dc/elements/1.1/"/>
-    <ds:schemaRef ds:uri="http://www.w3.org/XML/1998/namespace"/>
-    <ds:schemaRef ds:uri="http://schemas.openxmlformats.org/package/2006/metadata/core-properties"/>
-    <ds:schemaRef ds:uri="d7f5a7ab-2def-40a3-afd2-85d03e8f423c"/>
-  </ds:schemaRefs>
-</ds:datastoreItem>
-</file>
-
 <file path=customXml/itemProps3.xml><?xml version="1.0" encoding="utf-8"?>
 <ds:datastoreItem xmlns:ds="http://schemas.openxmlformats.org/officeDocument/2006/customXml" ds:itemID="{77AE5E60-3EE9-482E-890B-30FA5C1AAE15}">
   <ds:schemaRefs>

</xml_diff>